<commit_message>
Fall 2017 course updates
</commit_message>
<xml_diff>
--- a/lectures/infrastructure-week-14-final.pptx
+++ b/lectures/infrastructure-week-14-final.pptx
@@ -104,6 +104,11 @@
       </a:defRPr>
     </a:lvl9pPr>
   </p:defaultTextStyle>
+  <p:extLst>
+    <p:ext uri="{EFAFB233-063F-42B5-8137-9DF3F51BA10A}">
+      <p15:sldGuideLst xmlns:p15="http://schemas.microsoft.com/office/powerpoint/2012/main"/>
+    </p:ext>
+  </p:extLst>
 </p:presentation>
 </file>
 
@@ -238,7 +243,7 @@
           <a:p>
             <a:fld id="{EC4EA31E-8F8E-874E-8707-EA6F71849ACC}" type="datetimeFigureOut">
               <a:rPr lang="en-US" smtClean="0"/>
-              <a:t>12/12/16</a:t>
+              <a:t>5/14/17</a:t>
             </a:fld>
             <a:endParaRPr lang="en-US"/>
           </a:p>
@@ -403,7 +408,7 @@
           <a:p>
             <a:fld id="{EC4EA31E-8F8E-874E-8707-EA6F71849ACC}" type="datetimeFigureOut">
               <a:rPr lang="en-US" smtClean="0"/>
-              <a:t>12/12/16</a:t>
+              <a:t>5/14/17</a:t>
             </a:fld>
             <a:endParaRPr lang="en-US"/>
           </a:p>
@@ -578,7 +583,7 @@
           <a:p>
             <a:fld id="{EC4EA31E-8F8E-874E-8707-EA6F71849ACC}" type="datetimeFigureOut">
               <a:rPr lang="en-US" smtClean="0"/>
-              <a:t>12/12/16</a:t>
+              <a:t>5/14/17</a:t>
             </a:fld>
             <a:endParaRPr lang="en-US"/>
           </a:p>
@@ -743,7 +748,7 @@
           <a:p>
             <a:fld id="{EC4EA31E-8F8E-874E-8707-EA6F71849ACC}" type="datetimeFigureOut">
               <a:rPr lang="en-US" smtClean="0"/>
-              <a:t>12/12/16</a:t>
+              <a:t>5/14/17</a:t>
             </a:fld>
             <a:endParaRPr lang="en-US"/>
           </a:p>
@@ -984,7 +989,7 @@
           <a:p>
             <a:fld id="{EC4EA31E-8F8E-874E-8707-EA6F71849ACC}" type="datetimeFigureOut">
               <a:rPr lang="en-US" smtClean="0"/>
-              <a:t>12/12/16</a:t>
+              <a:t>5/14/17</a:t>
             </a:fld>
             <a:endParaRPr lang="en-US"/>
           </a:p>
@@ -1211,7 +1216,7 @@
           <a:p>
             <a:fld id="{EC4EA31E-8F8E-874E-8707-EA6F71849ACC}" type="datetimeFigureOut">
               <a:rPr lang="en-US" smtClean="0"/>
-              <a:t>12/12/16</a:t>
+              <a:t>5/14/17</a:t>
             </a:fld>
             <a:endParaRPr lang="en-US"/>
           </a:p>
@@ -1573,7 +1578,7 @@
           <a:p>
             <a:fld id="{EC4EA31E-8F8E-874E-8707-EA6F71849ACC}" type="datetimeFigureOut">
               <a:rPr lang="en-US" smtClean="0"/>
-              <a:t>12/12/16</a:t>
+              <a:t>5/14/17</a:t>
             </a:fld>
             <a:endParaRPr lang="en-US"/>
           </a:p>
@@ -1686,7 +1691,7 @@
           <a:p>
             <a:fld id="{EC4EA31E-8F8E-874E-8707-EA6F71849ACC}" type="datetimeFigureOut">
               <a:rPr lang="en-US" smtClean="0"/>
-              <a:t>12/12/16</a:t>
+              <a:t>5/14/17</a:t>
             </a:fld>
             <a:endParaRPr lang="en-US"/>
           </a:p>
@@ -1776,7 +1781,7 @@
           <a:p>
             <a:fld id="{EC4EA31E-8F8E-874E-8707-EA6F71849ACC}" type="datetimeFigureOut">
               <a:rPr lang="en-US" smtClean="0"/>
-              <a:t>12/12/16</a:t>
+              <a:t>5/14/17</a:t>
             </a:fld>
             <a:endParaRPr lang="en-US"/>
           </a:p>
@@ -2048,7 +2053,7 @@
           <a:p>
             <a:fld id="{EC4EA31E-8F8E-874E-8707-EA6F71849ACC}" type="datetimeFigureOut">
               <a:rPr lang="en-US" smtClean="0"/>
-              <a:t>12/12/16</a:t>
+              <a:t>5/14/17</a:t>
             </a:fld>
             <a:endParaRPr lang="en-US"/>
           </a:p>
@@ -2300,7 +2305,7 @@
           <a:p>
             <a:fld id="{EC4EA31E-8F8E-874E-8707-EA6F71849ACC}" type="datetimeFigureOut">
               <a:rPr lang="en-US" smtClean="0"/>
-              <a:t>12/12/16</a:t>
+              <a:t>5/14/17</a:t>
             </a:fld>
             <a:endParaRPr lang="en-US"/>
           </a:p>
@@ -2508,7 +2513,7 @@
           <a:p>
             <a:fld id="{EC4EA31E-8F8E-874E-8707-EA6F71849ACC}" type="datetimeFigureOut">
               <a:rPr lang="en-US" smtClean="0"/>
-              <a:t>12/12/16</a:t>
+              <a:t>5/14/17</a:t>
             </a:fld>
             <a:endParaRPr lang="en-US"/>
           </a:p>
@@ -2980,7 +2985,7 @@
         </p:spPr>
         <p:txBody>
           <a:bodyPr>
-            <a:normAutofit fontScale="85000" lnSpcReduction="20000"/>
+            <a:normAutofit lnSpcReduction="10000"/>
           </a:bodyPr>
           <a:lstStyle/>
           <a:p>
@@ -2990,7 +2995,35 @@
             </a:pPr>
             <a:r>
               <a:rPr lang="en-US" dirty="0" smtClean="0"/>
-              <a:t>54 Questions (24 true/false &amp; 30 multiple choice)</a:t>
+              <a:t>48</a:t>
+            </a:r>
+            <a:r>
+              <a:rPr lang="en-US" dirty="0" smtClean="0"/>
+              <a:t> </a:t>
+            </a:r>
+            <a:r>
+              <a:rPr lang="en-US" dirty="0" smtClean="0"/>
+              <a:t>Questions (</a:t>
+            </a:r>
+            <a:r>
+              <a:rPr lang="en-US" dirty="0" smtClean="0"/>
+              <a:t>20 </a:t>
+            </a:r>
+            <a:r>
+              <a:rPr lang="en-US" dirty="0" smtClean="0"/>
+              <a:t>true/false &amp; </a:t>
+            </a:r>
+            <a:r>
+              <a:rPr lang="en-US" dirty="0" smtClean="0"/>
+              <a:t>28</a:t>
+            </a:r>
+            <a:r>
+              <a:rPr lang="en-US" dirty="0" smtClean="0"/>
+              <a:t> </a:t>
+            </a:r>
+            <a:r>
+              <a:rPr lang="en-US" dirty="0" smtClean="0"/>
+              <a:t>multiple choice)</a:t>
             </a:r>
           </a:p>
           <a:p>
@@ -3027,25 +3060,13 @@
             </a:pPr>
             <a:r>
               <a:rPr lang="en-US" dirty="0" smtClean="0"/>
-              <a:t>You have the entire class period (but it shouldn’t take that long). </a:t>
-            </a:r>
-          </a:p>
-          <a:p>
-            <a:pPr marL="342900" indent="-342900" algn="l">
-              <a:buFont typeface="Arial" charset="0"/>
-              <a:buChar char="•"/>
-            </a:pPr>
+              <a:t>You have </a:t>
+            </a:r>
+            <a:r>
+              <a:rPr lang="en-US" dirty="0" smtClean="0"/>
+              <a:t>2 hours to complete the test. </a:t>
+            </a:r>
             <a:endParaRPr lang="en-US" dirty="0" smtClean="0"/>
-          </a:p>
-          <a:p>
-            <a:pPr marL="342900" indent="-342900" algn="l">
-              <a:buFont typeface="Arial" charset="0"/>
-              <a:buChar char="•"/>
-            </a:pPr>
-            <a:r>
-              <a:rPr lang="en-US" dirty="0" smtClean="0"/>
-              <a:t>Please print your name on blank sheet of paper I provided and turn it in after completing the exam.</a:t>
-            </a:r>
           </a:p>
           <a:p>
             <a:pPr marL="342900" indent="-342900" algn="l">

</xml_diff>

<commit_message>
update week13 lecture and week14 material
</commit_message>
<xml_diff>
--- a/lectures/infrastructure-week-14-final.pptx
+++ b/lectures/infrastructure-week-14-final.pptx
@@ -243,7 +243,7 @@
           <a:p>
             <a:fld id="{EC4EA31E-8F8E-874E-8707-EA6F71849ACC}" type="datetimeFigureOut">
               <a:rPr lang="en-US" smtClean="0"/>
-              <a:t>5/14/17</a:t>
+              <a:t>12/3/17</a:t>
             </a:fld>
             <a:endParaRPr lang="en-US"/>
           </a:p>
@@ -408,7 +408,7 @@
           <a:p>
             <a:fld id="{EC4EA31E-8F8E-874E-8707-EA6F71849ACC}" type="datetimeFigureOut">
               <a:rPr lang="en-US" smtClean="0"/>
-              <a:t>5/14/17</a:t>
+              <a:t>12/3/17</a:t>
             </a:fld>
             <a:endParaRPr lang="en-US"/>
           </a:p>
@@ -583,7 +583,7 @@
           <a:p>
             <a:fld id="{EC4EA31E-8F8E-874E-8707-EA6F71849ACC}" type="datetimeFigureOut">
               <a:rPr lang="en-US" smtClean="0"/>
-              <a:t>5/14/17</a:t>
+              <a:t>12/3/17</a:t>
             </a:fld>
             <a:endParaRPr lang="en-US"/>
           </a:p>
@@ -748,7 +748,7 @@
           <a:p>
             <a:fld id="{EC4EA31E-8F8E-874E-8707-EA6F71849ACC}" type="datetimeFigureOut">
               <a:rPr lang="en-US" smtClean="0"/>
-              <a:t>5/14/17</a:t>
+              <a:t>12/3/17</a:t>
             </a:fld>
             <a:endParaRPr lang="en-US"/>
           </a:p>
@@ -989,7 +989,7 @@
           <a:p>
             <a:fld id="{EC4EA31E-8F8E-874E-8707-EA6F71849ACC}" type="datetimeFigureOut">
               <a:rPr lang="en-US" smtClean="0"/>
-              <a:t>5/14/17</a:t>
+              <a:t>12/3/17</a:t>
             </a:fld>
             <a:endParaRPr lang="en-US"/>
           </a:p>
@@ -1216,7 +1216,7 @@
           <a:p>
             <a:fld id="{EC4EA31E-8F8E-874E-8707-EA6F71849ACC}" type="datetimeFigureOut">
               <a:rPr lang="en-US" smtClean="0"/>
-              <a:t>5/14/17</a:t>
+              <a:t>12/3/17</a:t>
             </a:fld>
             <a:endParaRPr lang="en-US"/>
           </a:p>
@@ -1578,7 +1578,7 @@
           <a:p>
             <a:fld id="{EC4EA31E-8F8E-874E-8707-EA6F71849ACC}" type="datetimeFigureOut">
               <a:rPr lang="en-US" smtClean="0"/>
-              <a:t>5/14/17</a:t>
+              <a:t>12/3/17</a:t>
             </a:fld>
             <a:endParaRPr lang="en-US"/>
           </a:p>
@@ -1691,7 +1691,7 @@
           <a:p>
             <a:fld id="{EC4EA31E-8F8E-874E-8707-EA6F71849ACC}" type="datetimeFigureOut">
               <a:rPr lang="en-US" smtClean="0"/>
-              <a:t>5/14/17</a:t>
+              <a:t>12/3/17</a:t>
             </a:fld>
             <a:endParaRPr lang="en-US"/>
           </a:p>
@@ -1781,7 +1781,7 @@
           <a:p>
             <a:fld id="{EC4EA31E-8F8E-874E-8707-EA6F71849ACC}" type="datetimeFigureOut">
               <a:rPr lang="en-US" smtClean="0"/>
-              <a:t>5/14/17</a:t>
+              <a:t>12/3/17</a:t>
             </a:fld>
             <a:endParaRPr lang="en-US"/>
           </a:p>
@@ -2053,7 +2053,7 @@
           <a:p>
             <a:fld id="{EC4EA31E-8F8E-874E-8707-EA6F71849ACC}" type="datetimeFigureOut">
               <a:rPr lang="en-US" smtClean="0"/>
-              <a:t>5/14/17</a:t>
+              <a:t>12/3/17</a:t>
             </a:fld>
             <a:endParaRPr lang="en-US"/>
           </a:p>
@@ -2305,7 +2305,7 @@
           <a:p>
             <a:fld id="{EC4EA31E-8F8E-874E-8707-EA6F71849ACC}" type="datetimeFigureOut">
               <a:rPr lang="en-US" smtClean="0"/>
-              <a:t>5/14/17</a:t>
+              <a:t>12/3/17</a:t>
             </a:fld>
             <a:endParaRPr lang="en-US"/>
           </a:p>
@@ -2513,7 +2513,7 @@
           <a:p>
             <a:fld id="{EC4EA31E-8F8E-874E-8707-EA6F71849ACC}" type="datetimeFigureOut">
               <a:rPr lang="en-US" smtClean="0"/>
-              <a:t>5/14/17</a:t>
+              <a:t>12/3/17</a:t>
             </a:fld>
             <a:endParaRPr lang="en-US"/>
           </a:p>
@@ -2948,20 +2948,24 @@
               <a:rPr lang="en-US" sz="3600" dirty="0"/>
             </a:br>
             <a:r>
-              <a:rPr lang="en-US" sz="3600"/>
+              <a:rPr lang="en-US" sz="3600" dirty="0"/>
               <a:t>SEIS </a:t>
             </a:r>
             <a:r>
-              <a:rPr lang="en-US" sz="3600" smtClean="0"/>
+              <a:rPr lang="en-US" sz="3600" dirty="0" smtClean="0"/>
               <a:t>665</a:t>
             </a:r>
             <a:r>
-              <a:rPr lang="en-US" sz="3600"/>
+              <a:rPr lang="en-US" sz="3600" dirty="0"/>
               <a:t> </a:t>
             </a:r>
             <a:r>
-              <a:rPr lang="en-US" sz="3600" smtClean="0"/>
-              <a:t>Final Exam</a:t>
+              <a:rPr lang="en-US" sz="3600" dirty="0" smtClean="0"/>
+              <a:t>Final </a:t>
+            </a:r>
+            <a:r>
+              <a:rPr lang="en-US" sz="3600" dirty="0" smtClean="0"/>
+              <a:t>Challenge</a:t>
             </a:r>
             <a:endParaRPr lang="en-US" sz="3600" dirty="0"/>
           </a:p>
@@ -2985,7 +2989,7 @@
         </p:spPr>
         <p:txBody>
           <a:bodyPr>
-            <a:normAutofit lnSpcReduction="10000"/>
+            <a:normAutofit fontScale="92500" lnSpcReduction="20000"/>
           </a:bodyPr>
           <a:lstStyle/>
           <a:p>
@@ -2995,56 +2999,17 @@
             </a:pPr>
             <a:r>
               <a:rPr lang="en-US" dirty="0" smtClean="0"/>
-              <a:t>48</a:t>
+              <a:t>Practical exam incorporating technologies from the 2</a:t>
+            </a:r>
+            <a:r>
+              <a:rPr lang="en-US" baseline="30000" dirty="0" smtClean="0"/>
+              <a:t>nd</a:t>
             </a:r>
             <a:r>
               <a:rPr lang="en-US" dirty="0" smtClean="0"/>
-              <a:t> </a:t>
-            </a:r>
-            <a:r>
-              <a:rPr lang="en-US" dirty="0" smtClean="0"/>
-              <a:t>Questions (</a:t>
-            </a:r>
-            <a:r>
-              <a:rPr lang="en-US" dirty="0" smtClean="0"/>
-              <a:t>20 </a:t>
-            </a:r>
-            <a:r>
-              <a:rPr lang="en-US" dirty="0" smtClean="0"/>
-              <a:t>true/false &amp; </a:t>
-            </a:r>
-            <a:r>
-              <a:rPr lang="en-US" dirty="0" smtClean="0"/>
-              <a:t>28</a:t>
-            </a:r>
-            <a:r>
-              <a:rPr lang="en-US" dirty="0" smtClean="0"/>
-              <a:t> </a:t>
-            </a:r>
-            <a:r>
-              <a:rPr lang="en-US" dirty="0" smtClean="0"/>
-              <a:t>multiple choice)</a:t>
-            </a:r>
-          </a:p>
-          <a:p>
-            <a:pPr marL="800100" lvl="1" indent="-342900" algn="l">
-              <a:buFont typeface="Arial" charset="0"/>
-              <a:buChar char="•"/>
-            </a:pPr>
-            <a:r>
-              <a:rPr lang="en-US" dirty="0" smtClean="0"/>
-              <a:t>True/false = 40%</a:t>
-            </a:r>
-          </a:p>
-          <a:p>
-            <a:pPr marL="800100" lvl="1" indent="-342900" algn="l">
-              <a:buFont typeface="Arial" charset="0"/>
-              <a:buChar char="•"/>
-            </a:pPr>
-            <a:r>
-              <a:rPr lang="en-US" dirty="0" smtClean="0"/>
-              <a:t>Multiple choice = 60%</a:t>
-            </a:r>
+              <a:t> half of the semester.</a:t>
+            </a:r>
+            <a:endParaRPr lang="en-US" dirty="0" smtClean="0"/>
           </a:p>
           <a:p>
             <a:pPr marL="342900" indent="-342900" algn="l">
@@ -3064,9 +3029,12 @@
             </a:r>
             <a:r>
               <a:rPr lang="en-US" dirty="0" smtClean="0"/>
-              <a:t>2 hours to complete the test. </a:t>
-            </a:r>
-            <a:endParaRPr lang="en-US" dirty="0" smtClean="0"/>
+              <a:t>3 </a:t>
+            </a:r>
+            <a:r>
+              <a:rPr lang="en-US" dirty="0" smtClean="0"/>
+              <a:t>hours to complete the test. </a:t>
+            </a:r>
           </a:p>
           <a:p>
             <a:pPr marL="342900" indent="-342900" algn="l">
@@ -3082,8 +3050,26 @@
             </a:pPr>
             <a:r>
               <a:rPr lang="en-US" dirty="0" smtClean="0"/>
-              <a:t>Select the best answer. Don’t over-analyze the questions. </a:t>
-            </a:r>
+              <a:t>Open book and Internet access. Slack and other private communications are forbidden.</a:t>
+            </a:r>
+          </a:p>
+          <a:p>
+            <a:pPr marL="342900" indent="-342900" algn="l">
+              <a:buFont typeface="Arial" charset="0"/>
+              <a:buChar char="•"/>
+            </a:pPr>
+            <a:endParaRPr lang="en-US" dirty="0"/>
+          </a:p>
+          <a:p>
+            <a:pPr marL="342900" indent="-342900" algn="l">
+              <a:buFont typeface="Arial" charset="0"/>
+              <a:buChar char="•"/>
+            </a:pPr>
+            <a:r>
+              <a:rPr lang="en-US" dirty="0" smtClean="0"/>
+              <a:t>You must submit a GitHub repository to receive credit for the exam.</a:t>
+            </a:r>
+            <a:endParaRPr lang="en-US" dirty="0" smtClean="0"/>
           </a:p>
           <a:p>
             <a:pPr marL="342900" indent="-342900" algn="l">

</xml_diff>

<commit_message>
update syllabus for spring 2018
</commit_message>
<xml_diff>
--- a/lectures/infrastructure-week-14-final.pptx
+++ b/lectures/infrastructure-week-14-final.pptx
@@ -243,7 +243,7 @@
           <a:p>
             <a:fld id="{EC4EA31E-8F8E-874E-8707-EA6F71849ACC}" type="datetimeFigureOut">
               <a:rPr lang="en-US" smtClean="0"/>
-              <a:t>12/3/17</a:t>
+              <a:t>12/11/17</a:t>
             </a:fld>
             <a:endParaRPr lang="en-US"/>
           </a:p>
@@ -408,7 +408,7 @@
           <a:p>
             <a:fld id="{EC4EA31E-8F8E-874E-8707-EA6F71849ACC}" type="datetimeFigureOut">
               <a:rPr lang="en-US" smtClean="0"/>
-              <a:t>12/3/17</a:t>
+              <a:t>12/11/17</a:t>
             </a:fld>
             <a:endParaRPr lang="en-US"/>
           </a:p>
@@ -583,7 +583,7 @@
           <a:p>
             <a:fld id="{EC4EA31E-8F8E-874E-8707-EA6F71849ACC}" type="datetimeFigureOut">
               <a:rPr lang="en-US" smtClean="0"/>
-              <a:t>12/3/17</a:t>
+              <a:t>12/11/17</a:t>
             </a:fld>
             <a:endParaRPr lang="en-US"/>
           </a:p>
@@ -748,7 +748,7 @@
           <a:p>
             <a:fld id="{EC4EA31E-8F8E-874E-8707-EA6F71849ACC}" type="datetimeFigureOut">
               <a:rPr lang="en-US" smtClean="0"/>
-              <a:t>12/3/17</a:t>
+              <a:t>12/11/17</a:t>
             </a:fld>
             <a:endParaRPr lang="en-US"/>
           </a:p>
@@ -989,7 +989,7 @@
           <a:p>
             <a:fld id="{EC4EA31E-8F8E-874E-8707-EA6F71849ACC}" type="datetimeFigureOut">
               <a:rPr lang="en-US" smtClean="0"/>
-              <a:t>12/3/17</a:t>
+              <a:t>12/11/17</a:t>
             </a:fld>
             <a:endParaRPr lang="en-US"/>
           </a:p>
@@ -1216,7 +1216,7 @@
           <a:p>
             <a:fld id="{EC4EA31E-8F8E-874E-8707-EA6F71849ACC}" type="datetimeFigureOut">
               <a:rPr lang="en-US" smtClean="0"/>
-              <a:t>12/3/17</a:t>
+              <a:t>12/11/17</a:t>
             </a:fld>
             <a:endParaRPr lang="en-US"/>
           </a:p>
@@ -1578,7 +1578,7 @@
           <a:p>
             <a:fld id="{EC4EA31E-8F8E-874E-8707-EA6F71849ACC}" type="datetimeFigureOut">
               <a:rPr lang="en-US" smtClean="0"/>
-              <a:t>12/3/17</a:t>
+              <a:t>12/11/17</a:t>
             </a:fld>
             <a:endParaRPr lang="en-US"/>
           </a:p>
@@ -1691,7 +1691,7 @@
           <a:p>
             <a:fld id="{EC4EA31E-8F8E-874E-8707-EA6F71849ACC}" type="datetimeFigureOut">
               <a:rPr lang="en-US" smtClean="0"/>
-              <a:t>12/3/17</a:t>
+              <a:t>12/11/17</a:t>
             </a:fld>
             <a:endParaRPr lang="en-US"/>
           </a:p>
@@ -1781,7 +1781,7 @@
           <a:p>
             <a:fld id="{EC4EA31E-8F8E-874E-8707-EA6F71849ACC}" type="datetimeFigureOut">
               <a:rPr lang="en-US" smtClean="0"/>
-              <a:t>12/3/17</a:t>
+              <a:t>12/11/17</a:t>
             </a:fld>
             <a:endParaRPr lang="en-US"/>
           </a:p>
@@ -2053,7 +2053,7 @@
           <a:p>
             <a:fld id="{EC4EA31E-8F8E-874E-8707-EA6F71849ACC}" type="datetimeFigureOut">
               <a:rPr lang="en-US" smtClean="0"/>
-              <a:t>12/3/17</a:t>
+              <a:t>12/11/17</a:t>
             </a:fld>
             <a:endParaRPr lang="en-US"/>
           </a:p>
@@ -2305,7 +2305,7 @@
           <a:p>
             <a:fld id="{EC4EA31E-8F8E-874E-8707-EA6F71849ACC}" type="datetimeFigureOut">
               <a:rPr lang="en-US" smtClean="0"/>
-              <a:t>12/3/17</a:t>
+              <a:t>12/11/17</a:t>
             </a:fld>
             <a:endParaRPr lang="en-US"/>
           </a:p>
@@ -2513,7 +2513,7 @@
           <a:p>
             <a:fld id="{EC4EA31E-8F8E-874E-8707-EA6F71849ACC}" type="datetimeFigureOut">
               <a:rPr lang="en-US" smtClean="0"/>
-              <a:t>12/3/17</a:t>
+              <a:t>12/11/17</a:t>
             </a:fld>
             <a:endParaRPr lang="en-US"/>
           </a:p>
@@ -2961,11 +2961,7 @@
             </a:r>
             <a:r>
               <a:rPr lang="en-US" sz="3600" dirty="0" smtClean="0"/>
-              <a:t>Final </a:t>
-            </a:r>
-            <a:r>
-              <a:rPr lang="en-US" sz="3600" dirty="0" smtClean="0"/>
-              <a:t>Challenge</a:t>
+              <a:t>Final Challenge</a:t>
             </a:r>
             <a:endParaRPr lang="en-US" sz="3600" dirty="0"/>
           </a:p>
@@ -2983,13 +2979,13 @@
         </p:nvSpPr>
         <p:spPr>
           <a:xfrm>
-            <a:off x="1173707" y="2130187"/>
-            <a:ext cx="7767851" cy="3956714"/>
+            <a:off x="814389" y="1700213"/>
+            <a:ext cx="8127170" cy="4386688"/>
           </a:xfrm>
         </p:spPr>
         <p:txBody>
           <a:bodyPr>
-            <a:normAutofit fontScale="92500" lnSpcReduction="20000"/>
+            <a:normAutofit fontScale="85000" lnSpcReduction="20000"/>
           </a:bodyPr>
           <a:lstStyle/>
           <a:p>
@@ -2999,7 +2995,11 @@
             </a:pPr>
             <a:r>
               <a:rPr lang="en-US" dirty="0" smtClean="0"/>
-              <a:t>Practical exam incorporating technologies from the 2</a:t>
+              <a:t>Practical </a:t>
+            </a:r>
+            <a:r>
+              <a:rPr lang="en-US" dirty="0" smtClean="0"/>
+              <a:t>exam incorporating technologies from the 2</a:t>
             </a:r>
             <a:r>
               <a:rPr lang="en-US" baseline="30000" dirty="0" smtClean="0"/>
@@ -3007,9 +3007,12 @@
             </a:r>
             <a:r>
               <a:rPr lang="en-US" dirty="0" smtClean="0"/>
-              <a:t> half of the semester.</a:t>
-            </a:r>
-            <a:endParaRPr lang="en-US" dirty="0" smtClean="0"/>
+              <a:t> half of the semester</a:t>
+            </a:r>
+            <a:r>
+              <a:rPr lang="en-US" dirty="0" smtClean="0"/>
+              <a:t>.</a:t>
+            </a:r>
           </a:p>
           <a:p>
             <a:pPr marL="342900" indent="-342900" algn="l">
@@ -3025,16 +3028,9 @@
             </a:pPr>
             <a:r>
               <a:rPr lang="en-US" dirty="0" smtClean="0"/>
-              <a:t>You have </a:t>
-            </a:r>
-            <a:r>
-              <a:rPr lang="en-US" dirty="0" smtClean="0"/>
-              <a:t>3 </a:t>
-            </a:r>
-            <a:r>
-              <a:rPr lang="en-US" dirty="0" smtClean="0"/>
-              <a:t>hours to complete the test. </a:t>
-            </a:r>
+              <a:t>Complete IDEA web evaluation!</a:t>
+            </a:r>
+            <a:endParaRPr lang="en-US" dirty="0" smtClean="0"/>
           </a:p>
           <a:p>
             <a:pPr marL="342900" indent="-342900" algn="l">
@@ -3050,7 +3046,19 @@
             </a:pPr>
             <a:r>
               <a:rPr lang="en-US" dirty="0" smtClean="0"/>
-              <a:t>Open book and Internet access. Slack and other private communications are forbidden.</a:t>
+              <a:t>You </a:t>
+            </a:r>
+            <a:r>
+              <a:rPr lang="en-US" smtClean="0"/>
+              <a:t>have </a:t>
+            </a:r>
+            <a:r>
+              <a:rPr lang="en-US" smtClean="0"/>
+              <a:t>until 9PM CST to </a:t>
+            </a:r>
+            <a:r>
+              <a:rPr lang="en-US" dirty="0" smtClean="0"/>
+              <a:t>complete the test. </a:t>
             </a:r>
           </a:p>
           <a:p>
@@ -3067,9 +3075,25 @@
             </a:pPr>
             <a:r>
               <a:rPr lang="en-US" dirty="0" smtClean="0"/>
+              <a:t>Open book and Internet access. Slack and other private communications are forbidden.</a:t>
+            </a:r>
+          </a:p>
+          <a:p>
+            <a:pPr marL="342900" indent="-342900" algn="l">
+              <a:buFont typeface="Arial" charset="0"/>
+              <a:buChar char="•"/>
+            </a:pPr>
+            <a:endParaRPr lang="en-US" dirty="0"/>
+          </a:p>
+          <a:p>
+            <a:pPr marL="342900" indent="-342900" algn="l">
+              <a:buFont typeface="Arial" charset="0"/>
+              <a:buChar char="•"/>
+            </a:pPr>
+            <a:r>
+              <a:rPr lang="en-US" dirty="0" smtClean="0"/>
               <a:t>You must submit a GitHub repository to receive credit for the exam.</a:t>
             </a:r>
-            <a:endParaRPr lang="en-US" dirty="0" smtClean="0"/>
           </a:p>
           <a:p>
             <a:pPr marL="342900" indent="-342900" algn="l">
@@ -3158,6 +3182,13 @@
   <p:clrMapOvr>
     <a:masterClrMapping/>
   </p:clrMapOvr>
+  <p:timing>
+    <p:tnLst>
+      <p:par>
+        <p:cTn id="1" dur="indefinite" restart="never" nodeType="tmRoot"/>
+      </p:par>
+    </p:tnLst>
+  </p:timing>
 </p:sld>
 </file>
 

</xml_diff>